<commit_message>
Updating slides gor sessions 1 & 2
</commit_message>
<xml_diff>
--- a/Chanco_STA623_BDA_2022_Henrion_Session1.pptx
+++ b/Chanco_STA623_BDA_2022_Henrion_Session1.pptx
@@ -5785,7 +5785,7 @@
           <p:cNvPr id="2" name="Title 1">
             <a:extLst>
               <a:ext uri="{FF2B5EF4-FFF2-40B4-BE49-F238E27FC236}">
-                <a16:creationId xmlns:a16="http://schemas.microsoft.com/office/drawing/2014/main" id="{D6AA89D5-560C-4369-A313-7C24EDF028A0}"/>
+                <a16:creationId xmlns:a16="http://schemas.microsoft.com/office/drawing/2014/main" id="{C5CC315F-F711-43BA-8C23-8D50769E33D2}"/>
               </a:ext>
             </a:extLst>
           </p:cNvPr>
@@ -5796,7 +5796,12 @@
             <p:ph type="title"/>
           </p:nvPr>
         </p:nvSpPr>
-        <p:spPr/>
+        <p:spPr>
+          <a:xfrm>
+            <a:off x="839788" y="457200"/>
+            <a:ext cx="3932237" cy="1600200"/>
+          </a:xfrm>
+        </p:spPr>
         <p:txBody>
           <a:bodyPr/>
           <a:lstStyle/>
@@ -5812,10 +5817,10 @@
       </p:sp>
       <p:sp>
         <p:nvSpPr>
-          <p:cNvPr id="3" name="Content Placeholder 2">
+          <p:cNvPr id="4" name="Text Placeholder 3">
             <a:extLst>
               <a:ext uri="{FF2B5EF4-FFF2-40B4-BE49-F238E27FC236}">
-                <a16:creationId xmlns:a16="http://schemas.microsoft.com/office/drawing/2014/main" id="{288BC91F-1C76-43AE-8B2A-956D48B768BE}"/>
+                <a16:creationId xmlns:a16="http://schemas.microsoft.com/office/drawing/2014/main" id="{F6C278EB-CD3C-4569-8B41-D3DDD3B4004E}"/>
               </a:ext>
             </a:extLst>
           </p:cNvPr>
@@ -5823,57 +5828,137 @@
             <a:spLocks noGrp="1"/>
           </p:cNvSpPr>
           <p:nvPr>
-            <p:ph idx="1"/>
+            <p:ph type="body" sz="half" idx="2"/>
           </p:nvPr>
         </p:nvSpPr>
         <p:spPr/>
         <p:txBody>
-          <a:bodyPr/>
+          <a:bodyPr>
+            <a:normAutofit/>
+          </a:bodyPr>
           <a:lstStyle/>
           <a:p>
-            <a:pPr lvl="0"/>
-            <a:r>
+            <a:pPr marL="342900" lvl="0" indent="-342900">
+              <a:buFont typeface="Arial" panose="020B0604020202020204" pitchFamily="34" charset="0"/>
+              <a:buChar char="•"/>
+            </a:pPr>
+            <a:r>
+              <a:rPr sz="2000" dirty="0"/>
               <a:t>These notes were written in </a:t>
             </a:r>
             <a:r>
-              <a:rPr>
+              <a:rPr sz="2000" dirty="0">
                 <a:latin typeface="Courier"/>
               </a:rPr>
               <a:t>quarto</a:t>
             </a:r>
             <a:r>
+              <a:rPr sz="2000" dirty="0"/>
               <a:t>.</a:t>
             </a:r>
-          </a:p>
-          <a:p>
-            <a:pPr lvl="0"/>
-            <a:r>
+            <a:endParaRPr lang="en-GB" sz="2000" dirty="0"/>
+          </a:p>
+          <a:p>
+            <a:pPr marL="342900" lvl="0" indent="-342900">
+              <a:buFont typeface="Arial" panose="020B0604020202020204" pitchFamily="34" charset="0"/>
+              <a:buChar char="•"/>
+            </a:pPr>
+            <a:endParaRPr sz="2000" dirty="0"/>
+          </a:p>
+          <a:p>
+            <a:pPr marL="342900" lvl="0" indent="-342900">
+              <a:buFont typeface="Arial" panose="020B0604020202020204" pitchFamily="34" charset="0"/>
+              <a:buChar char="•"/>
+            </a:pPr>
+            <a:r>
+              <a:rPr sz="2000" dirty="0"/>
               <a:t>All examples / code in these notes is </a:t>
             </a:r>
             <a:r>
-              <a:rPr>
+              <a:rPr sz="2000" dirty="0">
                 <a:latin typeface="Courier"/>
               </a:rPr>
               <a:t>R</a:t>
             </a:r>
             <a:r>
+              <a:rPr sz="2000" dirty="0"/>
               <a:t> and a combination of STAN / JAGS / BUGS for Bayesian model specification.</a:t>
             </a:r>
-          </a:p>
-          <a:p>
-            <a:pPr lvl="0"/>
-            <a:r>
-              <a:t>GitHub repository - will contain all course materials by the end of the week:</a:t>
-            </a:r>
-          </a:p>
-          <a:p>
-            <a:pPr marL="457200" lvl="1" indent="0">
-              <a:buNone/>
+            <a:endParaRPr lang="en-GB" sz="2000" dirty="0"/>
+          </a:p>
+          <a:p>
+            <a:pPr marL="342900" lvl="0" indent="-342900">
+              <a:buFont typeface="Arial" panose="020B0604020202020204" pitchFamily="34" charset="0"/>
+              <a:buChar char="•"/>
             </a:pPr>
-            <a:r>
-              <a:rPr>
-                <a:hlinkClick r:id="rId2"/>
-              </a:rPr>
+            <a:endParaRPr sz="2000" dirty="0"/>
+          </a:p>
+          <a:p>
+            <a:pPr marL="342900" lvl="0" indent="-342900">
+              <a:buFont typeface="Arial" panose="020B0604020202020204" pitchFamily="34" charset="0"/>
+              <a:buChar char="•"/>
+            </a:pPr>
+            <a:r>
+              <a:rPr sz="2000" dirty="0"/>
+              <a:t>GitHub repository - will contain all course materials by the end of the week.</a:t>
+            </a:r>
+          </a:p>
+        </p:txBody>
+      </p:sp>
+      <p:pic>
+        <p:nvPicPr>
+          <p:cNvPr id="3" name="Picture 1" descr="images/qrCodeGithubRepo.png"/>
+          <p:cNvPicPr>
+            <a:picLocks noGrp="1" noChangeAspect="1"/>
+          </p:cNvPicPr>
+          <p:nvPr/>
+        </p:nvPicPr>
+        <p:blipFill>
+          <a:blip r:embed="rId2"/>
+          <a:stretch>
+            <a:fillRect/>
+          </a:stretch>
+        </p:blipFill>
+        <p:spPr bwMode="auto">
+          <a:xfrm>
+            <a:off x="6096000" y="977900"/>
+            <a:ext cx="4356100" cy="4356100"/>
+          </a:xfrm>
+          <a:prstGeom prst="rect">
+            <a:avLst/>
+          </a:prstGeom>
+          <a:noFill/>
+          <a:ln w="9525">
+            <a:noFill/>
+            <a:headEnd/>
+            <a:tailEnd/>
+          </a:ln>
+        </p:spPr>
+      </p:pic>
+      <p:sp>
+        <p:nvSpPr>
+          <p:cNvPr id="5" name="TextBox 3"/>
+          <p:cNvSpPr txBox="1"/>
+          <p:nvPr/>
+        </p:nvSpPr>
+        <p:spPr>
+          <a:xfrm>
+            <a:off x="5181600" y="5334000"/>
+            <a:ext cx="6172200" cy="508000"/>
+          </a:xfrm>
+          <a:prstGeom prst="rect">
+            <a:avLst/>
+          </a:prstGeom>
+          <a:noFill/>
+        </p:spPr>
+        <p:txBody>
+          <a:bodyPr/>
+          <a:lstStyle/>
+          <a:p>
+            <a:pPr marL="0" lvl="0" indent="0" algn="ctr">
+              <a:buNone/>
+            </a:pPr>
+            <a:r>
               <a:t>https://github.com/gitMarcH/UNIMA_STA623_2023</a:t>
             </a:r>
           </a:p>
@@ -5881,10 +5966,10 @@
       </p:sp>
       <p:sp>
         <p:nvSpPr>
-          <p:cNvPr id="6" name="Slide Number Placeholder 5">
+          <p:cNvPr id="7" name="Slide Number Placeholder 6">
             <a:extLst>
               <a:ext uri="{FF2B5EF4-FFF2-40B4-BE49-F238E27FC236}">
-                <a16:creationId xmlns:a16="http://schemas.microsoft.com/office/drawing/2014/main" id="{C03F998A-2A5E-471F-9FEB-2559B0A7F93D}"/>
+                <a16:creationId xmlns:a16="http://schemas.microsoft.com/office/drawing/2014/main" id="{14DD33D4-F2B4-4E27-98BD-BC92728343CB}"/>
               </a:ext>
             </a:extLst>
           </p:cNvPr>

</xml_diff>